<commit_message>
make the graphs transparent
</commit_message>
<xml_diff>
--- a/Grocery-Bill.pptx
+++ b/Grocery-Bill.pptx
@@ -2844,7 +2844,7 @@
       </p:sp>
       <p:pic>
         <p:nvPicPr>
-          <p:cNvPr descr="Grocery-Bill_files/figure-pptx/scatter-1.png" id="0" name="Picture 1"/>
+          <p:cNvPr descr="scatter.png" id="0" name="Picture 1"/>
           <p:cNvPicPr>
             <a:picLocks noGrp="1" noChangeAspect="1"/>
           </p:cNvPicPr>
@@ -2858,7 +2858,7 @@
         </p:blipFill>
         <p:spPr bwMode="auto">
           <a:xfrm>
-            <a:off x="647700" y="889000"/>
+            <a:off x="635000" y="889000"/>
             <a:ext cx="7759700" cy="5041900"/>
           </a:xfrm>
           <a:prstGeom prst="rect">
@@ -2937,7 +2937,7 @@
       </p:sp>
       <p:pic>
         <p:nvPicPr>
-          <p:cNvPr descr="Grocery-Bill_files/figure-pptx/hist-1.png" id="0" name="Picture 1"/>
+          <p:cNvPr descr="hist.png" id="0" name="Picture 1"/>
           <p:cNvPicPr>
             <a:picLocks noGrp="1" noChangeAspect="1"/>
           </p:cNvPicPr>
@@ -2951,7 +2951,7 @@
         </p:blipFill>
         <p:spPr bwMode="auto">
           <a:xfrm>
-            <a:off x="647700" y="889000"/>
+            <a:off x="635000" y="889000"/>
             <a:ext cx="7759700" cy="5041900"/>
           </a:xfrm>
           <a:prstGeom prst="rect">
@@ -3054,7 +3054,7 @@
       </p:sp>
       <p:pic>
         <p:nvPicPr>
-          <p:cNvPr descr="Grocery-Bill_files/figure-pptx/bar-1.png" id="0" name="Picture 1"/>
+          <p:cNvPr descr="bar.png" id="0" name="Picture 1"/>
           <p:cNvPicPr>
             <a:picLocks noGrp="1" noChangeAspect="1"/>
           </p:cNvPicPr>
@@ -3068,7 +3068,7 @@
         </p:blipFill>
         <p:spPr bwMode="auto">
           <a:xfrm>
-            <a:off x="647700" y="889000"/>
+            <a:off x="635000" y="889000"/>
             <a:ext cx="7759700" cy="5041900"/>
           </a:xfrm>
           <a:prstGeom prst="rect">

</xml_diff>